<commit_message>
Removed broken relation in model
</commit_message>
<xml_diff>
--- a/Submission/ArtifactsInProcess/ThreatRiskSubmissionPictures.pptx
+++ b/Submission/ArtifactsInProcess/ThreatRiskSubmissionPictures.pptx
@@ -10,6 +10,8 @@
     <p:sldId id="258" r:id="rId4"/>
     <p:sldId id="259" r:id="rId5"/>
     <p:sldId id="260" r:id="rId6"/>
+    <p:sldId id="261" r:id="rId7"/>
+    <p:sldId id="262" r:id="rId8"/>
   </p:sldIdLst>
   <p:sldSz cx="9144000" cy="6858000" type="screen4x3"/>
   <p:notesSz cx="6858000" cy="9144000"/>
@@ -963,6 +965,256 @@
 </p:sldLayout>
 </file>
 
+<file path=ppt/slideLayouts/slideLayout13.xml><?xml version="1.0" encoding="utf-8"?>
+<p:sldLayout xmlns:a="http://schemas.openxmlformats.org/drawingml/2006/main" xmlns:r="http://schemas.openxmlformats.org/officeDocument/2006/relationships" xmlns:p="http://schemas.openxmlformats.org/presentationml/2006/main" userDrawn="1">
+  <p:cSld name="Content Slide">
+    <p:spTree>
+      <p:nvGrpSpPr>
+        <p:cNvPr id="1" name=""/>
+        <p:cNvGrpSpPr/>
+        <p:nvPr/>
+      </p:nvGrpSpPr>
+      <p:grpSpPr>
+        <a:xfrm>
+          <a:off x="0" y="0"/>
+          <a:ext cx="0" cy="0"/>
+          <a:chOff x="0" y="0"/>
+          <a:chExt cx="0" cy="0"/>
+        </a:xfrm>
+      </p:grpSpPr>
+      <p:pic>
+        <p:nvPicPr>
+          <p:cNvPr id="7" name="Picture 2"/>
+          <p:cNvPicPr>
+            <a:picLocks noChangeAspect="1" noChangeArrowheads="1"/>
+          </p:cNvPicPr>
+          <p:nvPr userDrawn="1"/>
+        </p:nvPicPr>
+        <p:blipFill>
+          <a:blip r:embed="rId2" cstate="print">
+            <a:extLst>
+              <a:ext uri="{28A0092B-C50C-407E-A947-70E740481C1C}">
+                <a14:useLocalDpi xmlns:a14="http://schemas.microsoft.com/office/drawing/2010/main" val="0"/>
+              </a:ext>
+            </a:extLst>
+          </a:blip>
+          <a:srcRect/>
+          <a:stretch>
+            <a:fillRect/>
+          </a:stretch>
+        </p:blipFill>
+        <p:spPr bwMode="auto">
+          <a:xfrm>
+            <a:off x="395536" y="847725"/>
+            <a:ext cx="8743384" cy="323850"/>
+          </a:xfrm>
+          <a:prstGeom prst="rect">
+            <a:avLst/>
+          </a:prstGeom>
+          <a:noFill/>
+          <a:ln>
+            <a:noFill/>
+          </a:ln>
+          <a:effectLst/>
+          <a:extLst>
+            <a:ext uri="{909E8E84-426E-40DD-AFC4-6F175D3DCCD1}">
+              <a14:hiddenFill xmlns:a14="http://schemas.microsoft.com/office/drawing/2010/main">
+                <a:solidFill>
+                  <a:schemeClr val="accent1"/>
+                </a:solidFill>
+              </a14:hiddenFill>
+            </a:ext>
+            <a:ext uri="{91240B29-F687-4F45-9708-019B960494DF}">
+              <a14:hiddenLine xmlns:a14="http://schemas.microsoft.com/office/drawing/2010/main" w="9525">
+                <a:solidFill>
+                  <a:schemeClr val="tx1"/>
+                </a:solidFill>
+                <a:miter lim="800000"/>
+                <a:headEnd/>
+                <a:tailEnd/>
+              </a14:hiddenLine>
+            </a:ext>
+            <a:ext uri="{AF507438-7753-43E0-B8FC-AC1667EBCBE1}">
+              <a14:hiddenEffects xmlns:a14="http://schemas.microsoft.com/office/drawing/2010/main">
+                <a:effectLst>
+                  <a:outerShdw dist="35921" dir="2700000" algn="ctr" rotWithShape="0">
+                    <a:schemeClr val="bg2"/>
+                  </a:outerShdw>
+                </a:effectLst>
+              </a14:hiddenEffects>
+            </a:ext>
+          </a:extLst>
+        </p:spPr>
+      </p:pic>
+      <p:sp>
+        <p:nvSpPr>
+          <p:cNvPr id="10" name="Title 9"/>
+          <p:cNvSpPr>
+            <a:spLocks noGrp="1"/>
+          </p:cNvSpPr>
+          <p:nvPr>
+            <p:ph type="title"/>
+          </p:nvPr>
+        </p:nvSpPr>
+        <p:spPr/>
+        <p:txBody>
+          <a:bodyPr/>
+          <a:lstStyle>
+            <a:lvl1pPr>
+              <a:defRPr sz="2400"/>
+            </a:lvl1pPr>
+          </a:lstStyle>
+          <a:p>
+            <a:r>
+              <a:rPr lang="en-US" dirty="0" smtClean="0"/>
+              <a:t>Click to edit Master title style</a:t>
+            </a:r>
+            <a:endParaRPr lang="en-CA" dirty="0"/>
+          </a:p>
+        </p:txBody>
+      </p:sp>
+      <p:sp>
+        <p:nvSpPr>
+          <p:cNvPr id="14" name="Text Placeholder 13"/>
+          <p:cNvSpPr>
+            <a:spLocks noGrp="1"/>
+          </p:cNvSpPr>
+          <p:nvPr>
+            <p:ph type="body" sz="quarter" idx="13"/>
+          </p:nvPr>
+        </p:nvSpPr>
+        <p:spPr>
+          <a:xfrm>
+            <a:off x="539552" y="1125538"/>
+            <a:ext cx="8353623" cy="5040312"/>
+          </a:xfrm>
+          <a:prstGeom prst="rect">
+            <a:avLst/>
+          </a:prstGeom>
+        </p:spPr>
+        <p:txBody>
+          <a:bodyPr/>
+          <a:lstStyle/>
+          <a:p>
+            <a:pPr lvl="0"/>
+            <a:r>
+              <a:rPr lang="en-US" dirty="0" smtClean="0"/>
+              <a:t>Click to edit Master text styles</a:t>
+            </a:r>
+          </a:p>
+          <a:p>
+            <a:pPr lvl="1"/>
+            <a:r>
+              <a:rPr lang="en-US" dirty="0" smtClean="0"/>
+              <a:t>Second level</a:t>
+            </a:r>
+          </a:p>
+          <a:p>
+            <a:pPr lvl="2"/>
+            <a:r>
+              <a:rPr lang="en-US" dirty="0" smtClean="0"/>
+              <a:t>Third level</a:t>
+            </a:r>
+          </a:p>
+          <a:p>
+            <a:pPr lvl="3"/>
+            <a:r>
+              <a:rPr lang="en-US" dirty="0" smtClean="0"/>
+              <a:t>Fourth level</a:t>
+            </a:r>
+          </a:p>
+          <a:p>
+            <a:pPr lvl="4"/>
+            <a:r>
+              <a:rPr lang="en-US" dirty="0" smtClean="0"/>
+              <a:t>Fifth level</a:t>
+            </a:r>
+            <a:endParaRPr lang="en-CA" dirty="0"/>
+          </a:p>
+        </p:txBody>
+      </p:sp>
+      <p:cxnSp>
+        <p:nvCxnSpPr>
+          <p:cNvPr id="8" name="Straight Connector 7"/>
+          <p:cNvCxnSpPr/>
+          <p:nvPr userDrawn="1"/>
+        </p:nvCxnSpPr>
+        <p:spPr>
+          <a:xfrm>
+            <a:off x="395536" y="6172200"/>
+            <a:ext cx="8510339" cy="0"/>
+          </a:xfrm>
+          <a:prstGeom prst="line">
+            <a:avLst/>
+          </a:prstGeom>
+          <a:ln w="76200">
+            <a:solidFill>
+              <a:srgbClr val="D1D2D3"/>
+            </a:solidFill>
+          </a:ln>
+        </p:spPr>
+        <p:style>
+          <a:lnRef idx="1">
+            <a:schemeClr val="accent1"/>
+          </a:lnRef>
+          <a:fillRef idx="0">
+            <a:schemeClr val="accent1"/>
+          </a:fillRef>
+          <a:effectRef idx="0">
+            <a:schemeClr val="accent1"/>
+          </a:effectRef>
+          <a:fontRef idx="minor">
+            <a:schemeClr val="tx1"/>
+          </a:fontRef>
+        </p:style>
+      </p:cxnSp>
+      <p:pic>
+        <p:nvPicPr>
+          <p:cNvPr id="13" name="Picture 12" descr="Depositphotos_2721359_S.jpg"/>
+          <p:cNvPicPr>
+            <a:picLocks noChangeAspect="1"/>
+          </p:cNvPicPr>
+          <p:nvPr userDrawn="1"/>
+        </p:nvPicPr>
+        <p:blipFill>
+          <a:blip r:embed="rId3" cstate="print"/>
+          <a:stretch>
+            <a:fillRect/>
+          </a:stretch>
+        </p:blipFill>
+        <p:spPr>
+          <a:xfrm>
+            <a:off x="352425" y="47625"/>
+            <a:ext cx="1619672" cy="777240"/>
+          </a:xfrm>
+          <a:prstGeom prst="rect">
+            <a:avLst/>
+          </a:prstGeom>
+          <a:effectLst>
+            <a:softEdge rad="127000"/>
+          </a:effectLst>
+        </p:spPr>
+      </p:pic>
+    </p:spTree>
+    <p:extLst>
+      <p:ext uri="{BB962C8B-B14F-4D97-AF65-F5344CB8AC3E}">
+        <p14:creationId xmlns:p14="http://schemas.microsoft.com/office/powerpoint/2010/main" val="2551029730"/>
+      </p:ext>
+    </p:extLst>
+  </p:cSld>
+  <p:clrMapOvr>
+    <a:masterClrMapping/>
+  </p:clrMapOvr>
+  <p:timing>
+    <p:tnLst>
+      <p:par>
+        <p:cTn id="1" dur="indefinite" restart="never" nodeType="tmRoot"/>
+      </p:par>
+    </p:tnLst>
+  </p:timing>
+</p:sldLayout>
+</file>
+
 <file path=ppt/slideLayouts/slideLayout2.xml><?xml version="1.0" encoding="utf-8"?>
 <p:sldLayout xmlns:a="http://schemas.openxmlformats.org/drawingml/2006/main" xmlns:r="http://schemas.openxmlformats.org/officeDocument/2006/relationships" xmlns:p="http://schemas.openxmlformats.org/presentationml/2006/main" type="obj" preserve="1">
   <p:cSld name="Title and Content">
@@ -3089,6 +3341,7 @@
     <p:sldLayoutId id="2147483658" r:id="rId10"/>
     <p:sldLayoutId id="2147483659" r:id="rId11"/>
     <p:sldLayoutId id="2147483660" r:id="rId12"/>
+    <p:sldLayoutId id="2147483661" r:id="rId13"/>
   </p:sldLayoutIdLst>
   <p:txStyles>
     <p:titleStyle>
@@ -4454,13 +4707,13 @@
       </p:grpSpPr>
       <p:sp>
         <p:nvSpPr>
-          <p:cNvPr id="5" name="Rounded Rectangle 4"/>
+          <p:cNvPr id="4" name="Rounded Rectangle 3"/>
           <p:cNvSpPr/>
           <p:nvPr/>
         </p:nvSpPr>
         <p:spPr>
           <a:xfrm>
-            <a:off x="970808" y="4648200"/>
+            <a:off x="933203" y="2743200"/>
             <a:ext cx="6934200" cy="1905000"/>
           </a:xfrm>
           <a:prstGeom prst="roundRect">
@@ -4495,158 +4748,15 @@
             <a:pPr algn="ctr"/>
             <a:r>
               <a:rPr lang="en-US" dirty="0" smtClean="0"/>
-              <a:t>Data</a:t>
+              <a:t>Capabilities</a:t>
             </a:r>
             <a:endParaRPr lang="en-US" dirty="0"/>
-          </a:p>
-        </p:txBody>
-      </p:sp>
-      <p:sp>
-        <p:nvSpPr>
-          <p:cNvPr id="2" name="Rounded Rectangle 1"/>
-          <p:cNvSpPr/>
-          <p:nvPr/>
-        </p:nvSpPr>
-        <p:spPr>
-          <a:xfrm>
-            <a:off x="914400" y="838200"/>
-            <a:ext cx="6934200" cy="1905000"/>
-          </a:xfrm>
-          <a:prstGeom prst="roundRect">
-            <a:avLst/>
-          </a:prstGeom>
-          <a:solidFill>
-            <a:schemeClr val="accent1">
-              <a:alpha val="85000"/>
-            </a:schemeClr>
-          </a:solidFill>
-        </p:spPr>
-        <p:style>
-          <a:lnRef idx="2">
-            <a:schemeClr val="accent1">
-              <a:shade val="50000"/>
-            </a:schemeClr>
-          </a:lnRef>
-          <a:fillRef idx="1">
-            <a:schemeClr val="accent1"/>
-          </a:fillRef>
-          <a:effectRef idx="0">
-            <a:schemeClr val="accent1"/>
-          </a:effectRef>
-          <a:fontRef idx="minor">
-            <a:schemeClr val="lt1"/>
-          </a:fontRef>
-        </p:style>
-        <p:txBody>
-          <a:bodyPr vert="vert270" rtlCol="0" anchor="t" anchorCtr="0"/>
-          <a:lstStyle/>
-          <a:p>
-            <a:pPr algn="ctr"/>
-            <a:r>
-              <a:rPr lang="en-US" dirty="0" smtClean="0"/>
-              <a:t>Stakeholder Knowledge</a:t>
-            </a:r>
-            <a:endParaRPr lang="en-US" dirty="0"/>
-          </a:p>
-        </p:txBody>
-      </p:sp>
-      <p:sp>
-        <p:nvSpPr>
-          <p:cNvPr id="4" name="Rounded Rectangle 3"/>
-          <p:cNvSpPr/>
-          <p:nvPr/>
-        </p:nvSpPr>
-        <p:spPr>
-          <a:xfrm>
-            <a:off x="933203" y="2743200"/>
-            <a:ext cx="6934200" cy="1905000"/>
-          </a:xfrm>
-          <a:prstGeom prst="roundRect">
-            <a:avLst/>
-          </a:prstGeom>
-          <a:solidFill>
-            <a:schemeClr val="accent1">
-              <a:alpha val="85000"/>
-            </a:schemeClr>
-          </a:solidFill>
-        </p:spPr>
-        <p:style>
-          <a:lnRef idx="2">
-            <a:schemeClr val="accent1">
-              <a:shade val="50000"/>
-            </a:schemeClr>
-          </a:lnRef>
-          <a:fillRef idx="1">
-            <a:schemeClr val="accent1"/>
-          </a:fillRef>
-          <a:effectRef idx="0">
-            <a:schemeClr val="accent1"/>
-          </a:effectRef>
-          <a:fontRef idx="minor">
-            <a:schemeClr val="lt1"/>
-          </a:fontRef>
-        </p:style>
-        <p:txBody>
-          <a:bodyPr vert="vert270" rtlCol="0" anchor="t" anchorCtr="0"/>
-          <a:lstStyle/>
-          <a:p>
-            <a:pPr algn="ctr"/>
-            <a:r>
-              <a:rPr lang="en-US" dirty="0" smtClean="0"/>
-              <a:t>Capabilities</a:t>
-            </a:r>
-            <a:endParaRPr lang="en-US" dirty="0"/>
-          </a:p>
-        </p:txBody>
-      </p:sp>
-      <p:sp>
-        <p:nvSpPr>
-          <p:cNvPr id="3" name="Isosceles Triangle 2"/>
-          <p:cNvSpPr/>
-          <p:nvPr/>
-        </p:nvSpPr>
-        <p:spPr>
-          <a:xfrm>
-            <a:off x="1219200" y="241655"/>
-            <a:ext cx="6477000" cy="6311545"/>
-          </a:xfrm>
-          <a:prstGeom prst="triangle">
-            <a:avLst/>
-          </a:prstGeom>
-          <a:solidFill>
-            <a:schemeClr val="accent1">
-              <a:alpha val="66000"/>
-            </a:schemeClr>
-          </a:solidFill>
-        </p:spPr>
-        <p:style>
-          <a:lnRef idx="2">
-            <a:schemeClr val="accent1">
-              <a:shade val="50000"/>
-            </a:schemeClr>
-          </a:lnRef>
-          <a:fillRef idx="1">
-            <a:schemeClr val="accent1"/>
-          </a:fillRef>
-          <a:effectRef idx="0">
-            <a:schemeClr val="accent1"/>
-          </a:effectRef>
-          <a:fontRef idx="minor">
-            <a:schemeClr val="lt1"/>
-          </a:fontRef>
-        </p:style>
-        <p:txBody>
-          <a:bodyPr rtlCol="0" anchor="ctr"/>
-          <a:lstStyle/>
-          <a:p>
-            <a:pPr algn="ctr"/>
-            <a:endParaRPr lang="en-US"/>
           </a:p>
         </p:txBody>
       </p:sp>
       <p:pic>
         <p:nvPicPr>
-          <p:cNvPr id="8" name="Picture 16" descr="C:\Users\Cory\AppData\Local\Microsoft\Windows\Temporary Internet Files\Content.IE5\2E2TCEXO\nri1154-f1[1].gif"/>
+          <p:cNvPr id="19" name="Picture 2" descr="C:\Users\Cory\AppData\Local\Microsoft\Windows\Temporary Internet Files\Content.IE5\2E2TCEXO\big-data[1].jpg"/>
           <p:cNvPicPr>
             <a:picLocks noChangeAspect="1" noChangeArrowheads="1"/>
           </p:cNvPicPr>
@@ -4667,8 +4777,8 @@
         </p:blipFill>
         <p:spPr bwMode="auto">
           <a:xfrm>
-            <a:off x="2743200" y="5036427"/>
-            <a:ext cx="1284214" cy="1380530"/>
+            <a:off x="2209800" y="2711627"/>
+            <a:ext cx="1828800" cy="1371600"/>
           </a:xfrm>
           <a:prstGeom prst="rect">
             <a:avLst/>
@@ -4685,9 +4795,152 @@
           </a:extLst>
         </p:spPr>
       </p:pic>
+      <p:sp>
+        <p:nvSpPr>
+          <p:cNvPr id="5" name="Rounded Rectangle 4"/>
+          <p:cNvSpPr/>
+          <p:nvPr/>
+        </p:nvSpPr>
+        <p:spPr>
+          <a:xfrm>
+            <a:off x="970808" y="4648200"/>
+            <a:ext cx="6934200" cy="1905000"/>
+          </a:xfrm>
+          <a:prstGeom prst="roundRect">
+            <a:avLst/>
+          </a:prstGeom>
+          <a:solidFill>
+            <a:schemeClr val="accent1">
+              <a:alpha val="85000"/>
+            </a:schemeClr>
+          </a:solidFill>
+        </p:spPr>
+        <p:style>
+          <a:lnRef idx="2">
+            <a:schemeClr val="accent1">
+              <a:shade val="50000"/>
+            </a:schemeClr>
+          </a:lnRef>
+          <a:fillRef idx="1">
+            <a:schemeClr val="accent1"/>
+          </a:fillRef>
+          <a:effectRef idx="0">
+            <a:schemeClr val="accent1"/>
+          </a:effectRef>
+          <a:fontRef idx="minor">
+            <a:schemeClr val="lt1"/>
+          </a:fontRef>
+        </p:style>
+        <p:txBody>
+          <a:bodyPr vert="vert270" rtlCol="0" anchor="t" anchorCtr="0"/>
+          <a:lstStyle/>
+          <a:p>
+            <a:pPr algn="ctr"/>
+            <a:r>
+              <a:rPr lang="en-US" dirty="0" smtClean="0"/>
+              <a:t>Data</a:t>
+            </a:r>
+            <a:endParaRPr lang="en-US" dirty="0"/>
+          </a:p>
+        </p:txBody>
+      </p:sp>
+      <p:sp>
+        <p:nvSpPr>
+          <p:cNvPr id="2" name="Rounded Rectangle 1"/>
+          <p:cNvSpPr/>
+          <p:nvPr/>
+        </p:nvSpPr>
+        <p:spPr>
+          <a:xfrm>
+            <a:off x="914400" y="838200"/>
+            <a:ext cx="6934200" cy="1905000"/>
+          </a:xfrm>
+          <a:prstGeom prst="roundRect">
+            <a:avLst/>
+          </a:prstGeom>
+          <a:solidFill>
+            <a:schemeClr val="accent1">
+              <a:alpha val="85000"/>
+            </a:schemeClr>
+          </a:solidFill>
+        </p:spPr>
+        <p:style>
+          <a:lnRef idx="2">
+            <a:schemeClr val="accent1">
+              <a:shade val="50000"/>
+            </a:schemeClr>
+          </a:lnRef>
+          <a:fillRef idx="1">
+            <a:schemeClr val="accent1"/>
+          </a:fillRef>
+          <a:effectRef idx="0">
+            <a:schemeClr val="accent1"/>
+          </a:effectRef>
+          <a:fontRef idx="minor">
+            <a:schemeClr val="lt1"/>
+          </a:fontRef>
+        </p:style>
+        <p:txBody>
+          <a:bodyPr vert="vert270" rtlCol="0" anchor="t" anchorCtr="0"/>
+          <a:lstStyle/>
+          <a:p>
+            <a:pPr algn="ctr"/>
+            <a:r>
+              <a:rPr lang="en-US" dirty="0" smtClean="0"/>
+              <a:t>Stakeholder Knowledge</a:t>
+            </a:r>
+            <a:endParaRPr lang="en-US" dirty="0"/>
+          </a:p>
+        </p:txBody>
+      </p:sp>
+      <p:sp>
+        <p:nvSpPr>
+          <p:cNvPr id="3" name="Isosceles Triangle 2"/>
+          <p:cNvSpPr/>
+          <p:nvPr/>
+        </p:nvSpPr>
+        <p:spPr>
+          <a:xfrm>
+            <a:off x="1219200" y="241655"/>
+            <a:ext cx="6477000" cy="6311545"/>
+          </a:xfrm>
+          <a:prstGeom prst="triangle">
+            <a:avLst/>
+          </a:prstGeom>
+          <a:solidFill>
+            <a:schemeClr val="accent1">
+              <a:alpha val="66000"/>
+            </a:schemeClr>
+          </a:solidFill>
+        </p:spPr>
+        <p:style>
+          <a:lnRef idx="2">
+            <a:schemeClr val="accent1">
+              <a:shade val="50000"/>
+            </a:schemeClr>
+          </a:lnRef>
+          <a:fillRef idx="1">
+            <a:schemeClr val="accent1"/>
+          </a:fillRef>
+          <a:effectRef idx="0">
+            <a:schemeClr val="accent1"/>
+          </a:effectRef>
+          <a:fontRef idx="minor">
+            <a:schemeClr val="lt1"/>
+          </a:fontRef>
+        </p:style>
+        <p:txBody>
+          <a:bodyPr rtlCol="0" anchor="ctr"/>
+          <a:lstStyle/>
+          <a:p>
+            <a:pPr algn="ctr"/>
+            <a:endParaRPr lang="en-US"/>
+          </a:p>
+        </p:txBody>
+      </p:sp>
       <p:pic>
         <p:nvPicPr>
-          <p:cNvPr id="1026" name="Picture 2" descr="C:\Program Files (x86)\Microsoft Office\MEDIA\CAGCAT10\j0195812.wmf"/>
+          <p:cNvPr id="8" name="Picture 16" descr="C:\Users\Cory\AppData\Local\Microsoft\Windows\Temporary Internet Files\Content.IE5\2E2TCEXO\nri1154-f1[1].gif"/>
           <p:cNvPicPr>
             <a:picLocks noChangeAspect="1" noChangeArrowheads="1"/>
           </p:cNvPicPr>
@@ -4708,8 +4961,8 @@
         </p:blipFill>
         <p:spPr bwMode="auto">
           <a:xfrm>
-            <a:off x="3800562" y="1114736"/>
-            <a:ext cx="1314276" cy="1351928"/>
+            <a:off x="2743200" y="5036427"/>
+            <a:ext cx="1284214" cy="1380530"/>
           </a:xfrm>
           <a:prstGeom prst="rect">
             <a:avLst/>
@@ -4728,7 +4981,7 @@
       </p:pic>
       <p:pic>
         <p:nvPicPr>
-          <p:cNvPr id="6" name="Picture 4" descr="C:\Users\Cory\AppData\Local\Microsoft\Windows\Temporary Internet Files\Content.IE5\ER8PH0AL\MP900202201[1].jpg"/>
+          <p:cNvPr id="1026" name="Picture 2" descr="C:\Program Files (x86)\Microsoft Office\MEDIA\CAGCAT10\j0195812.wmf"/>
           <p:cNvPicPr>
             <a:picLocks noChangeAspect="1" noChangeArrowheads="1"/>
           </p:cNvPicPr>
@@ -4749,8 +5002,8 @@
         </p:blipFill>
         <p:spPr bwMode="auto">
           <a:xfrm>
-            <a:off x="3652477" y="4826816"/>
-            <a:ext cx="1193514" cy="803447"/>
+            <a:off x="3800562" y="1114736"/>
+            <a:ext cx="1314276" cy="1351928"/>
           </a:xfrm>
           <a:prstGeom prst="rect">
             <a:avLst/>
@@ -4769,7 +5022,7 @@
       </p:pic>
       <p:pic>
         <p:nvPicPr>
-          <p:cNvPr id="7" name="Picture 11" descr="C:\Users\Cory\AppData\Local\Microsoft\Windows\Temporary Internet Files\Content.IE5\636D9IYS\threat[1].jpg"/>
+          <p:cNvPr id="6" name="Picture 4" descr="C:\Users\Cory\AppData\Local\Microsoft\Windows\Temporary Internet Files\Content.IE5\ER8PH0AL\MP900202201[1].jpg"/>
           <p:cNvPicPr>
             <a:picLocks noChangeAspect="1" noChangeArrowheads="1"/>
           </p:cNvPicPr>
@@ -4790,8 +5043,8 @@
         </p:blipFill>
         <p:spPr bwMode="auto">
           <a:xfrm>
-            <a:off x="6477000" y="4864893"/>
-            <a:ext cx="1030129" cy="1471613"/>
+            <a:off x="3652477" y="4826816"/>
+            <a:ext cx="1193514" cy="803447"/>
           </a:xfrm>
           <a:prstGeom prst="rect">
             <a:avLst/>
@@ -4810,14 +5063,14 @@
       </p:pic>
       <p:pic>
         <p:nvPicPr>
-          <p:cNvPr id="9" name="Picture 20" descr="https://encrypted-tbn1.gstatic.com/images?q=tbn:ANd9GcQlNNJpvmdojzxQdRzFk3MOJQQKfRqLVOQ-Mbn-7VIkBbAI5TCzXA"/>
+          <p:cNvPr id="7" name="Picture 11" descr="C:\Users\Cory\AppData\Local\Microsoft\Windows\Temporary Internet Files\Content.IE5\636D9IYS\threat[1].jpg"/>
           <p:cNvPicPr>
             <a:picLocks noChangeAspect="1" noChangeArrowheads="1"/>
           </p:cNvPicPr>
           <p:nvPr/>
         </p:nvPicPr>
         <p:blipFill>
-          <a:blip r:embed="rId6">
+          <a:blip r:embed="rId6" cstate="print">
             <a:extLst>
               <a:ext uri="{28A0092B-C50C-407E-A947-70E740481C1C}">
                 <a14:useLocalDpi xmlns:a14="http://schemas.microsoft.com/office/drawing/2010/main" val="0"/>
@@ -4831,8 +5084,8 @@
         </p:blipFill>
         <p:spPr bwMode="auto">
           <a:xfrm>
-            <a:off x="4572000" y="4811296"/>
-            <a:ext cx="1578808" cy="1578808"/>
+            <a:off x="6477000" y="4864893"/>
+            <a:ext cx="1030129" cy="1471613"/>
           </a:xfrm>
           <a:prstGeom prst="rect">
             <a:avLst/>
@@ -4851,14 +5104,14 @@
       </p:pic>
       <p:pic>
         <p:nvPicPr>
-          <p:cNvPr id="10" name="Picture 12" descr="C:\Users\Cory\AppData\Local\Microsoft\Windows\Temporary Internet Files\Content.IE5\636D9IYS\eHealth[1].jpg"/>
+          <p:cNvPr id="9" name="Picture 20" descr="https://encrypted-tbn1.gstatic.com/images?q=tbn:ANd9GcQlNNJpvmdojzxQdRzFk3MOJQQKfRqLVOQ-Mbn-7VIkBbAI5TCzXA"/>
           <p:cNvPicPr>
             <a:picLocks noChangeAspect="1" noChangeArrowheads="1"/>
           </p:cNvPicPr>
           <p:nvPr/>
         </p:nvPicPr>
         <p:blipFill>
-          <a:blip r:embed="rId7" cstate="print">
+          <a:blip r:embed="rId7">
             <a:extLst>
               <a:ext uri="{28A0092B-C50C-407E-A947-70E740481C1C}">
                 <a14:useLocalDpi xmlns:a14="http://schemas.microsoft.com/office/drawing/2010/main" val="0"/>
@@ -4872,8 +5125,8 @@
         </p:blipFill>
         <p:spPr bwMode="auto">
           <a:xfrm>
-            <a:off x="1524000" y="4643747"/>
-            <a:ext cx="1685874" cy="1078492"/>
+            <a:off x="4572000" y="4811296"/>
+            <a:ext cx="1578808" cy="1578808"/>
           </a:xfrm>
           <a:prstGeom prst="rect">
             <a:avLst/>
@@ -4892,7 +5145,7 @@
       </p:pic>
       <p:pic>
         <p:nvPicPr>
-          <p:cNvPr id="11" name="Picture 2" descr="C:\Users\Cory\AppData\Local\Microsoft\Windows\Temporary Internet Files\Content.IE5\M23DN4D3\cyber_security[1].jpg"/>
+          <p:cNvPr id="10" name="Picture 12" descr="C:\Users\Cory\AppData\Local\Microsoft\Windows\Temporary Internet Files\Content.IE5\636D9IYS\eHealth[1].jpg"/>
           <p:cNvPicPr>
             <a:picLocks noChangeAspect="1" noChangeArrowheads="1"/>
           </p:cNvPicPr>
@@ -4913,8 +5166,8 @@
         </p:blipFill>
         <p:spPr bwMode="auto">
           <a:xfrm>
-            <a:off x="2366937" y="2743200"/>
-            <a:ext cx="1273654" cy="1273654"/>
+            <a:off x="1524000" y="4643747"/>
+            <a:ext cx="1685874" cy="1078492"/>
           </a:xfrm>
           <a:prstGeom prst="rect">
             <a:avLst/>
@@ -6028,6 +6281,1336 @@
     <p:extLst>
       <p:ext uri="{BB962C8B-B14F-4D97-AF65-F5344CB8AC3E}">
         <p14:creationId xmlns:p14="http://schemas.microsoft.com/office/powerpoint/2010/main" val="1813022820"/>
+      </p:ext>
+    </p:extLst>
+  </p:cSld>
+  <p:clrMapOvr>
+    <a:masterClrMapping/>
+  </p:clrMapOvr>
+  <p:timing>
+    <p:tnLst>
+      <p:par>
+        <p:cTn id="1" dur="indefinite" restart="never" nodeType="tmRoot"/>
+      </p:par>
+    </p:tnLst>
+  </p:timing>
+</p:sld>
+</file>
+
+<file path=ppt/slides/slide6.xml><?xml version="1.0" encoding="utf-8"?>
+<p:sld xmlns:a="http://schemas.openxmlformats.org/drawingml/2006/main" xmlns:r="http://schemas.openxmlformats.org/officeDocument/2006/relationships" xmlns:p="http://schemas.openxmlformats.org/presentationml/2006/main">
+  <p:cSld>
+    <p:spTree>
+      <p:nvGrpSpPr>
+        <p:cNvPr id="1" name=""/>
+        <p:cNvGrpSpPr/>
+        <p:nvPr/>
+      </p:nvGrpSpPr>
+      <p:grpSpPr>
+        <a:xfrm>
+          <a:off x="0" y="0"/>
+          <a:ext cx="0" cy="0"/>
+          <a:chOff x="0" y="0"/>
+          <a:chExt cx="0" cy="0"/>
+        </a:xfrm>
+      </p:grpSpPr>
+      <p:sp>
+        <p:nvSpPr>
+          <p:cNvPr id="4" name="Oval 3"/>
+          <p:cNvSpPr/>
+          <p:nvPr/>
+        </p:nvSpPr>
+        <p:spPr>
+          <a:xfrm>
+            <a:off x="635000" y="1104900"/>
+            <a:ext cx="241300" cy="266700"/>
+          </a:xfrm>
+          <a:prstGeom prst="ellipse">
+            <a:avLst/>
+          </a:prstGeom>
+        </p:spPr>
+        <p:style>
+          <a:lnRef idx="1">
+            <a:schemeClr val="accent1"/>
+          </a:lnRef>
+          <a:fillRef idx="3">
+            <a:schemeClr val="accent1"/>
+          </a:fillRef>
+          <a:effectRef idx="2">
+            <a:schemeClr val="accent1"/>
+          </a:effectRef>
+          <a:fontRef idx="minor">
+            <a:schemeClr val="lt1"/>
+          </a:fontRef>
+        </p:style>
+        <p:txBody>
+          <a:bodyPr rtlCol="0" anchor="ctr"/>
+          <a:lstStyle/>
+          <a:p>
+            <a:pPr algn="ctr"/>
+            <a:endParaRPr lang="en-US"/>
+          </a:p>
+        </p:txBody>
+      </p:sp>
+      <p:sp>
+        <p:nvSpPr>
+          <p:cNvPr id="5" name="Oval 4"/>
+          <p:cNvSpPr/>
+          <p:nvPr/>
+        </p:nvSpPr>
+        <p:spPr>
+          <a:xfrm>
+            <a:off x="838200" y="1384300"/>
+            <a:ext cx="381000" cy="368300"/>
+          </a:xfrm>
+          <a:prstGeom prst="ellipse">
+            <a:avLst/>
+          </a:prstGeom>
+        </p:spPr>
+        <p:style>
+          <a:lnRef idx="1">
+            <a:schemeClr val="accent1"/>
+          </a:lnRef>
+          <a:fillRef idx="3">
+            <a:schemeClr val="accent1"/>
+          </a:fillRef>
+          <a:effectRef idx="2">
+            <a:schemeClr val="accent1"/>
+          </a:effectRef>
+          <a:fontRef idx="minor">
+            <a:schemeClr val="lt1"/>
+          </a:fontRef>
+        </p:style>
+        <p:txBody>
+          <a:bodyPr rtlCol="0" anchor="ctr"/>
+          <a:lstStyle/>
+          <a:p>
+            <a:pPr algn="ctr"/>
+            <a:endParaRPr lang="en-US"/>
+          </a:p>
+        </p:txBody>
+      </p:sp>
+      <p:sp>
+        <p:nvSpPr>
+          <p:cNvPr id="6" name="Oval 5"/>
+          <p:cNvSpPr/>
+          <p:nvPr/>
+        </p:nvSpPr>
+        <p:spPr>
+          <a:xfrm>
+            <a:off x="1193800" y="1816100"/>
+            <a:ext cx="711200" cy="571500"/>
+          </a:xfrm>
+          <a:prstGeom prst="ellipse">
+            <a:avLst/>
+          </a:prstGeom>
+        </p:spPr>
+        <p:style>
+          <a:lnRef idx="1">
+            <a:schemeClr val="accent1"/>
+          </a:lnRef>
+          <a:fillRef idx="3">
+            <a:schemeClr val="accent1"/>
+          </a:fillRef>
+          <a:effectRef idx="2">
+            <a:schemeClr val="accent1"/>
+          </a:effectRef>
+          <a:fontRef idx="minor">
+            <a:schemeClr val="lt1"/>
+          </a:fontRef>
+        </p:style>
+        <p:txBody>
+          <a:bodyPr rtlCol="0" anchor="ctr"/>
+          <a:lstStyle/>
+          <a:p>
+            <a:pPr algn="ctr"/>
+            <a:endParaRPr lang="en-US"/>
+          </a:p>
+        </p:txBody>
+      </p:sp>
+      <p:sp>
+        <p:nvSpPr>
+          <p:cNvPr id="7" name="Oval 6"/>
+          <p:cNvSpPr/>
+          <p:nvPr/>
+        </p:nvSpPr>
+        <p:spPr>
+          <a:xfrm>
+            <a:off x="1651000" y="2298700"/>
+            <a:ext cx="825500" cy="660400"/>
+          </a:xfrm>
+          <a:prstGeom prst="ellipse">
+            <a:avLst/>
+          </a:prstGeom>
+        </p:spPr>
+        <p:style>
+          <a:lnRef idx="1">
+            <a:schemeClr val="accent1"/>
+          </a:lnRef>
+          <a:fillRef idx="3">
+            <a:schemeClr val="accent1"/>
+          </a:fillRef>
+          <a:effectRef idx="2">
+            <a:schemeClr val="accent1"/>
+          </a:effectRef>
+          <a:fontRef idx="minor">
+            <a:schemeClr val="lt1"/>
+          </a:fontRef>
+        </p:style>
+        <p:txBody>
+          <a:bodyPr rtlCol="0" anchor="ctr"/>
+          <a:lstStyle/>
+          <a:p>
+            <a:pPr algn="ctr"/>
+            <a:endParaRPr lang="en-US"/>
+          </a:p>
+        </p:txBody>
+      </p:sp>
+      <p:sp>
+        <p:nvSpPr>
+          <p:cNvPr id="8" name="Oval 7"/>
+          <p:cNvSpPr/>
+          <p:nvPr/>
+        </p:nvSpPr>
+        <p:spPr>
+          <a:xfrm>
+            <a:off x="2286000" y="2705100"/>
+            <a:ext cx="1206500" cy="914400"/>
+          </a:xfrm>
+          <a:prstGeom prst="ellipse">
+            <a:avLst/>
+          </a:prstGeom>
+        </p:spPr>
+        <p:style>
+          <a:lnRef idx="1">
+            <a:schemeClr val="accent1"/>
+          </a:lnRef>
+          <a:fillRef idx="3">
+            <a:schemeClr val="accent1"/>
+          </a:fillRef>
+          <a:effectRef idx="2">
+            <a:schemeClr val="accent1"/>
+          </a:effectRef>
+          <a:fontRef idx="minor">
+            <a:schemeClr val="lt1"/>
+          </a:fontRef>
+        </p:style>
+        <p:txBody>
+          <a:bodyPr rtlCol="0" anchor="ctr"/>
+          <a:lstStyle/>
+          <a:p>
+            <a:pPr algn="ctr"/>
+            <a:endParaRPr lang="en-US"/>
+          </a:p>
+        </p:txBody>
+      </p:sp>
+      <p:sp>
+        <p:nvSpPr>
+          <p:cNvPr id="10" name="Oval 9"/>
+          <p:cNvSpPr/>
+          <p:nvPr/>
+        </p:nvSpPr>
+        <p:spPr>
+          <a:xfrm>
+            <a:off x="3149600" y="3035300"/>
+            <a:ext cx="2400300" cy="1460500"/>
+          </a:xfrm>
+          <a:prstGeom prst="ellipse">
+            <a:avLst/>
+          </a:prstGeom>
+        </p:spPr>
+        <p:style>
+          <a:lnRef idx="1">
+            <a:schemeClr val="accent1"/>
+          </a:lnRef>
+          <a:fillRef idx="3">
+            <a:schemeClr val="accent1"/>
+          </a:fillRef>
+          <a:effectRef idx="2">
+            <a:schemeClr val="accent1"/>
+          </a:effectRef>
+          <a:fontRef idx="minor">
+            <a:schemeClr val="lt1"/>
+          </a:fontRef>
+        </p:style>
+        <p:txBody>
+          <a:bodyPr rtlCol="0" anchor="ctr"/>
+          <a:lstStyle/>
+          <a:p>
+            <a:pPr algn="ctr"/>
+            <a:endParaRPr lang="en-US"/>
+          </a:p>
+        </p:txBody>
+      </p:sp>
+      <p:sp>
+        <p:nvSpPr>
+          <p:cNvPr id="11" name="Oval 10"/>
+          <p:cNvSpPr/>
+          <p:nvPr/>
+        </p:nvSpPr>
+        <p:spPr>
+          <a:xfrm>
+            <a:off x="7785100" y="1092200"/>
+            <a:ext cx="241300" cy="266700"/>
+          </a:xfrm>
+          <a:prstGeom prst="ellipse">
+            <a:avLst/>
+          </a:prstGeom>
+        </p:spPr>
+        <p:style>
+          <a:lnRef idx="1">
+            <a:schemeClr val="accent1"/>
+          </a:lnRef>
+          <a:fillRef idx="3">
+            <a:schemeClr val="accent1"/>
+          </a:fillRef>
+          <a:effectRef idx="2">
+            <a:schemeClr val="accent1"/>
+          </a:effectRef>
+          <a:fontRef idx="minor">
+            <a:schemeClr val="lt1"/>
+          </a:fontRef>
+        </p:style>
+        <p:txBody>
+          <a:bodyPr rtlCol="0" anchor="ctr"/>
+          <a:lstStyle/>
+          <a:p>
+            <a:pPr algn="ctr"/>
+            <a:endParaRPr lang="en-US"/>
+          </a:p>
+        </p:txBody>
+      </p:sp>
+      <p:sp>
+        <p:nvSpPr>
+          <p:cNvPr id="12" name="Oval 11"/>
+          <p:cNvSpPr/>
+          <p:nvPr/>
+        </p:nvSpPr>
+        <p:spPr>
+          <a:xfrm>
+            <a:off x="7505700" y="1409700"/>
+            <a:ext cx="381000" cy="368300"/>
+          </a:xfrm>
+          <a:prstGeom prst="ellipse">
+            <a:avLst/>
+          </a:prstGeom>
+        </p:spPr>
+        <p:style>
+          <a:lnRef idx="1">
+            <a:schemeClr val="accent1"/>
+          </a:lnRef>
+          <a:fillRef idx="3">
+            <a:schemeClr val="accent1"/>
+          </a:fillRef>
+          <a:effectRef idx="2">
+            <a:schemeClr val="accent1"/>
+          </a:effectRef>
+          <a:fontRef idx="minor">
+            <a:schemeClr val="lt1"/>
+          </a:fontRef>
+        </p:style>
+        <p:txBody>
+          <a:bodyPr rtlCol="0" anchor="ctr"/>
+          <a:lstStyle/>
+          <a:p>
+            <a:pPr algn="ctr"/>
+            <a:endParaRPr lang="en-US"/>
+          </a:p>
+        </p:txBody>
+      </p:sp>
+      <p:sp>
+        <p:nvSpPr>
+          <p:cNvPr id="13" name="Oval 12"/>
+          <p:cNvSpPr/>
+          <p:nvPr/>
+        </p:nvSpPr>
+        <p:spPr>
+          <a:xfrm>
+            <a:off x="6997700" y="1739900"/>
+            <a:ext cx="711200" cy="571500"/>
+          </a:xfrm>
+          <a:prstGeom prst="ellipse">
+            <a:avLst/>
+          </a:prstGeom>
+        </p:spPr>
+        <p:style>
+          <a:lnRef idx="1">
+            <a:schemeClr val="accent1"/>
+          </a:lnRef>
+          <a:fillRef idx="3">
+            <a:schemeClr val="accent1"/>
+          </a:fillRef>
+          <a:effectRef idx="2">
+            <a:schemeClr val="accent1"/>
+          </a:effectRef>
+          <a:fontRef idx="minor">
+            <a:schemeClr val="lt1"/>
+          </a:fontRef>
+        </p:style>
+        <p:txBody>
+          <a:bodyPr rtlCol="0" anchor="ctr"/>
+          <a:lstStyle/>
+          <a:p>
+            <a:pPr algn="ctr"/>
+            <a:endParaRPr lang="en-US"/>
+          </a:p>
+        </p:txBody>
+      </p:sp>
+      <p:sp>
+        <p:nvSpPr>
+          <p:cNvPr id="14" name="Oval 13"/>
+          <p:cNvSpPr/>
+          <p:nvPr/>
+        </p:nvSpPr>
+        <p:spPr>
+          <a:xfrm>
+            <a:off x="6477000" y="2171700"/>
+            <a:ext cx="825500" cy="660400"/>
+          </a:xfrm>
+          <a:prstGeom prst="ellipse">
+            <a:avLst/>
+          </a:prstGeom>
+        </p:spPr>
+        <p:style>
+          <a:lnRef idx="1">
+            <a:schemeClr val="accent1"/>
+          </a:lnRef>
+          <a:fillRef idx="3">
+            <a:schemeClr val="accent1"/>
+          </a:fillRef>
+          <a:effectRef idx="2">
+            <a:schemeClr val="accent1"/>
+          </a:effectRef>
+          <a:fontRef idx="minor">
+            <a:schemeClr val="lt1"/>
+          </a:fontRef>
+        </p:style>
+        <p:txBody>
+          <a:bodyPr rtlCol="0" anchor="ctr"/>
+          <a:lstStyle/>
+          <a:p>
+            <a:pPr algn="ctr"/>
+            <a:endParaRPr lang="en-US"/>
+          </a:p>
+        </p:txBody>
+      </p:sp>
+      <p:sp>
+        <p:nvSpPr>
+          <p:cNvPr id="15" name="Oval 14"/>
+          <p:cNvSpPr/>
+          <p:nvPr/>
+        </p:nvSpPr>
+        <p:spPr>
+          <a:xfrm>
+            <a:off x="5638800" y="2540000"/>
+            <a:ext cx="1206500" cy="914400"/>
+          </a:xfrm>
+          <a:prstGeom prst="ellipse">
+            <a:avLst/>
+          </a:prstGeom>
+        </p:spPr>
+        <p:style>
+          <a:lnRef idx="1">
+            <a:schemeClr val="accent1"/>
+          </a:lnRef>
+          <a:fillRef idx="3">
+            <a:schemeClr val="accent1"/>
+          </a:fillRef>
+          <a:effectRef idx="2">
+            <a:schemeClr val="accent1"/>
+          </a:effectRef>
+          <a:fontRef idx="minor">
+            <a:schemeClr val="lt1"/>
+          </a:fontRef>
+        </p:style>
+        <p:txBody>
+          <a:bodyPr rtlCol="0" anchor="ctr"/>
+          <a:lstStyle/>
+          <a:p>
+            <a:pPr algn="ctr"/>
+            <a:endParaRPr lang="en-US"/>
+          </a:p>
+        </p:txBody>
+      </p:sp>
+      <p:sp>
+        <p:nvSpPr>
+          <p:cNvPr id="16" name="TextBox 15"/>
+          <p:cNvSpPr txBox="1"/>
+          <p:nvPr/>
+        </p:nvSpPr>
+        <p:spPr>
+          <a:xfrm>
+            <a:off x="4064000" y="2336800"/>
+            <a:ext cx="619506" cy="369332"/>
+          </a:xfrm>
+          <a:prstGeom prst="rect">
+            <a:avLst/>
+          </a:prstGeom>
+          <a:noFill/>
+        </p:spPr>
+        <p:txBody>
+          <a:bodyPr wrap="none" rtlCol="0">
+            <a:spAutoFit/>
+          </a:bodyPr>
+          <a:lstStyle/>
+          <a:p>
+            <a:r>
+              <a:rPr lang="en-US" dirty="0" smtClean="0"/>
+              <a:t>Now</a:t>
+            </a:r>
+            <a:endParaRPr lang="en-US" dirty="0"/>
+          </a:p>
+        </p:txBody>
+      </p:sp>
+      <p:sp>
+        <p:nvSpPr>
+          <p:cNvPr id="17" name="TextBox 16"/>
+          <p:cNvSpPr txBox="1"/>
+          <p:nvPr/>
+        </p:nvSpPr>
+        <p:spPr>
+          <a:xfrm>
+            <a:off x="2438400" y="1638300"/>
+            <a:ext cx="574534" cy="369332"/>
+          </a:xfrm>
+          <a:prstGeom prst="rect">
+            <a:avLst/>
+          </a:prstGeom>
+          <a:noFill/>
+        </p:spPr>
+        <p:txBody>
+          <a:bodyPr wrap="none" rtlCol="0">
+            <a:spAutoFit/>
+          </a:bodyPr>
+          <a:lstStyle/>
+          <a:p>
+            <a:r>
+              <a:rPr lang="en-US" dirty="0" smtClean="0"/>
+              <a:t>Past</a:t>
+            </a:r>
+            <a:endParaRPr lang="en-US" dirty="0"/>
+          </a:p>
+        </p:txBody>
+      </p:sp>
+      <p:sp>
+        <p:nvSpPr>
+          <p:cNvPr id="18" name="TextBox 17"/>
+          <p:cNvSpPr txBox="1"/>
+          <p:nvPr/>
+        </p:nvSpPr>
+        <p:spPr>
+          <a:xfrm>
+            <a:off x="5524500" y="1638300"/>
+            <a:ext cx="802887" cy="369332"/>
+          </a:xfrm>
+          <a:prstGeom prst="rect">
+            <a:avLst/>
+          </a:prstGeom>
+          <a:noFill/>
+        </p:spPr>
+        <p:txBody>
+          <a:bodyPr wrap="none" rtlCol="0">
+            <a:spAutoFit/>
+          </a:bodyPr>
+          <a:lstStyle/>
+          <a:p>
+            <a:r>
+              <a:rPr lang="en-US" dirty="0" smtClean="0"/>
+              <a:t>Future</a:t>
+            </a:r>
+            <a:endParaRPr lang="en-US" dirty="0"/>
+          </a:p>
+        </p:txBody>
+      </p:sp>
+      <p:sp>
+        <p:nvSpPr>
+          <p:cNvPr id="19" name="Up Arrow 18"/>
+          <p:cNvSpPr/>
+          <p:nvPr/>
+        </p:nvSpPr>
+        <p:spPr>
+          <a:xfrm>
+            <a:off x="660400" y="1828800"/>
+            <a:ext cx="484632" cy="978408"/>
+          </a:xfrm>
+          <a:prstGeom prst="upArrow">
+            <a:avLst/>
+          </a:prstGeom>
+          <a:solidFill>
+            <a:srgbClr val="FF6600"/>
+          </a:solidFill>
+        </p:spPr>
+        <p:style>
+          <a:lnRef idx="1">
+            <a:schemeClr val="accent1"/>
+          </a:lnRef>
+          <a:fillRef idx="3">
+            <a:schemeClr val="accent1"/>
+          </a:fillRef>
+          <a:effectRef idx="2">
+            <a:schemeClr val="accent1"/>
+          </a:effectRef>
+          <a:fontRef idx="minor">
+            <a:schemeClr val="lt1"/>
+          </a:fontRef>
+        </p:style>
+        <p:txBody>
+          <a:bodyPr rtlCol="0" anchor="ctr"/>
+          <a:lstStyle/>
+          <a:p>
+            <a:pPr algn="ctr"/>
+            <a:endParaRPr lang="en-US"/>
+          </a:p>
+        </p:txBody>
+      </p:sp>
+      <p:sp>
+        <p:nvSpPr>
+          <p:cNvPr id="20" name="Up Arrow 19"/>
+          <p:cNvSpPr/>
+          <p:nvPr/>
+        </p:nvSpPr>
+        <p:spPr>
+          <a:xfrm>
+            <a:off x="3708400" y="4572000"/>
+            <a:ext cx="484632" cy="978408"/>
+          </a:xfrm>
+          <a:prstGeom prst="upArrow">
+            <a:avLst/>
+          </a:prstGeom>
+          <a:solidFill>
+            <a:srgbClr val="99CC00"/>
+          </a:solidFill>
+        </p:spPr>
+        <p:style>
+          <a:lnRef idx="1">
+            <a:schemeClr val="accent1"/>
+          </a:lnRef>
+          <a:fillRef idx="3">
+            <a:schemeClr val="accent1"/>
+          </a:fillRef>
+          <a:effectRef idx="2">
+            <a:schemeClr val="accent1"/>
+          </a:effectRef>
+          <a:fontRef idx="minor">
+            <a:schemeClr val="lt1"/>
+          </a:fontRef>
+        </p:style>
+        <p:txBody>
+          <a:bodyPr rtlCol="0" anchor="ctr"/>
+          <a:lstStyle/>
+          <a:p>
+            <a:pPr algn="ctr"/>
+            <a:endParaRPr lang="en-US"/>
+          </a:p>
+        </p:txBody>
+      </p:sp>
+      <p:sp>
+        <p:nvSpPr>
+          <p:cNvPr id="21" name="Curved Up Arrow 20"/>
+          <p:cNvSpPr/>
+          <p:nvPr/>
+        </p:nvSpPr>
+        <p:spPr>
+          <a:xfrm rot="2258839">
+            <a:off x="800100" y="4330700"/>
+            <a:ext cx="2108200" cy="553720"/>
+          </a:xfrm>
+          <a:prstGeom prst="curvedUpArrow">
+            <a:avLst/>
+          </a:prstGeom>
+        </p:spPr>
+        <p:style>
+          <a:lnRef idx="1">
+            <a:schemeClr val="accent1"/>
+          </a:lnRef>
+          <a:fillRef idx="3">
+            <a:schemeClr val="accent1"/>
+          </a:fillRef>
+          <a:effectRef idx="2">
+            <a:schemeClr val="accent1"/>
+          </a:effectRef>
+          <a:fontRef idx="minor">
+            <a:schemeClr val="lt1"/>
+          </a:fontRef>
+        </p:style>
+        <p:txBody>
+          <a:bodyPr rtlCol="0" anchor="ctr"/>
+          <a:lstStyle/>
+          <a:p>
+            <a:pPr algn="ctr"/>
+            <a:endParaRPr lang="en-US">
+              <a:solidFill>
+                <a:schemeClr val="tx1"/>
+              </a:solidFill>
+            </a:endParaRPr>
+          </a:p>
+        </p:txBody>
+      </p:sp>
+      <p:sp>
+        <p:nvSpPr>
+          <p:cNvPr id="22" name="TextBox 21"/>
+          <p:cNvSpPr txBox="1"/>
+          <p:nvPr/>
+        </p:nvSpPr>
+        <p:spPr>
+          <a:xfrm>
+            <a:off x="76200" y="2819400"/>
+            <a:ext cx="777752" cy="369332"/>
+          </a:xfrm>
+          <a:prstGeom prst="rect">
+            <a:avLst/>
+          </a:prstGeom>
+          <a:noFill/>
+        </p:spPr>
+        <p:txBody>
+          <a:bodyPr wrap="none" rtlCol="0">
+            <a:spAutoFit/>
+          </a:bodyPr>
+          <a:lstStyle/>
+          <a:p>
+            <a:r>
+              <a:rPr lang="en-US" dirty="0" smtClean="0"/>
+              <a:t>Attack</a:t>
+            </a:r>
+            <a:endParaRPr lang="en-US" dirty="0"/>
+          </a:p>
+        </p:txBody>
+      </p:sp>
+      <p:sp>
+        <p:nvSpPr>
+          <p:cNvPr id="23" name="TextBox 22"/>
+          <p:cNvSpPr txBox="1"/>
+          <p:nvPr/>
+        </p:nvSpPr>
+        <p:spPr>
+          <a:xfrm>
+            <a:off x="3924300" y="3378200"/>
+            <a:ext cx="834896" cy="369332"/>
+          </a:xfrm>
+          <a:prstGeom prst="rect">
+            <a:avLst/>
+          </a:prstGeom>
+          <a:noFill/>
+        </p:spPr>
+        <p:txBody>
+          <a:bodyPr wrap="none" rtlCol="0">
+            <a:spAutoFit/>
+          </a:bodyPr>
+          <a:lstStyle/>
+          <a:p>
+            <a:r>
+              <a:rPr lang="en-US" dirty="0" smtClean="0"/>
+              <a:t>system</a:t>
+            </a:r>
+            <a:endParaRPr lang="en-US" dirty="0"/>
+          </a:p>
+        </p:txBody>
+      </p:sp>
+      <p:sp>
+        <p:nvSpPr>
+          <p:cNvPr id="24" name="TextBox 23"/>
+          <p:cNvSpPr txBox="1"/>
+          <p:nvPr/>
+        </p:nvSpPr>
+        <p:spPr>
+          <a:xfrm>
+            <a:off x="457200" y="4572000"/>
+            <a:ext cx="1953542" cy="954107"/>
+          </a:xfrm>
+          <a:prstGeom prst="rect">
+            <a:avLst/>
+          </a:prstGeom>
+          <a:noFill/>
+        </p:spPr>
+        <p:txBody>
+          <a:bodyPr wrap="none" rtlCol="0">
+            <a:spAutoFit/>
+          </a:bodyPr>
+          <a:lstStyle/>
+          <a:p>
+            <a:r>
+              <a:rPr lang="en-US" sz="1400" i="1" dirty="0" smtClean="0"/>
+              <a:t>Indicators,</a:t>
+            </a:r>
+          </a:p>
+          <a:p>
+            <a:r>
+              <a:rPr lang="en-US" sz="1400" i="1" dirty="0" smtClean="0"/>
+              <a:t>Patterns,</a:t>
+            </a:r>
+          </a:p>
+          <a:p>
+            <a:r>
+              <a:rPr lang="en-US" sz="1400" i="1" dirty="0" smtClean="0"/>
+              <a:t>Courses of actions,</a:t>
+            </a:r>
+          </a:p>
+          <a:p>
+            <a:r>
+              <a:rPr lang="en-US" sz="1400" i="1" dirty="0" smtClean="0"/>
+              <a:t>Other useful knowledge</a:t>
+            </a:r>
+            <a:endParaRPr lang="en-US" sz="1400" i="1" dirty="0"/>
+          </a:p>
+        </p:txBody>
+      </p:sp>
+      <p:sp>
+        <p:nvSpPr>
+          <p:cNvPr id="25" name="TextBox 24"/>
+          <p:cNvSpPr txBox="1"/>
+          <p:nvPr/>
+        </p:nvSpPr>
+        <p:spPr>
+          <a:xfrm>
+            <a:off x="3378200" y="5651500"/>
+            <a:ext cx="1150150" cy="369332"/>
+          </a:xfrm>
+          <a:prstGeom prst="rect">
+            <a:avLst/>
+          </a:prstGeom>
+          <a:noFill/>
+        </p:spPr>
+        <p:txBody>
+          <a:bodyPr wrap="none" rtlCol="0">
+            <a:spAutoFit/>
+          </a:bodyPr>
+          <a:lstStyle/>
+          <a:p>
+            <a:r>
+              <a:rPr lang="en-US" dirty="0" smtClean="0"/>
+              <a:t>Mitigation</a:t>
+            </a:r>
+            <a:endParaRPr lang="en-US" dirty="0"/>
+          </a:p>
+        </p:txBody>
+      </p:sp>
+      <p:sp>
+        <p:nvSpPr>
+          <p:cNvPr id="26" name="Oval 25"/>
+          <p:cNvSpPr/>
+          <p:nvPr/>
+        </p:nvSpPr>
+        <p:spPr>
+          <a:xfrm>
+            <a:off x="203200" y="2349500"/>
+            <a:ext cx="292100" cy="292100"/>
+          </a:xfrm>
+          <a:prstGeom prst="ellipse">
+            <a:avLst/>
+          </a:prstGeom>
+          <a:noFill/>
+        </p:spPr>
+        <p:style>
+          <a:lnRef idx="1">
+            <a:schemeClr val="accent1"/>
+          </a:lnRef>
+          <a:fillRef idx="3">
+            <a:schemeClr val="accent1"/>
+          </a:fillRef>
+          <a:effectRef idx="2">
+            <a:schemeClr val="accent1"/>
+          </a:effectRef>
+          <a:fontRef idx="minor">
+            <a:schemeClr val="lt1"/>
+          </a:fontRef>
+        </p:style>
+        <p:txBody>
+          <a:bodyPr rtlCol="0" anchor="ctr"/>
+          <a:lstStyle/>
+          <a:p>
+            <a:pPr algn="ctr"/>
+            <a:endParaRPr lang="en-US"/>
+          </a:p>
+        </p:txBody>
+      </p:sp>
+      <p:sp>
+        <p:nvSpPr>
+          <p:cNvPr id="27" name="TextBox 26"/>
+          <p:cNvSpPr txBox="1"/>
+          <p:nvPr/>
+        </p:nvSpPr>
+        <p:spPr>
+          <a:xfrm>
+            <a:off x="190500" y="2311400"/>
+            <a:ext cx="301660" cy="369332"/>
+          </a:xfrm>
+          <a:prstGeom prst="rect">
+            <a:avLst/>
+          </a:prstGeom>
+          <a:noFill/>
+        </p:spPr>
+        <p:txBody>
+          <a:bodyPr wrap="none" rtlCol="0">
+            <a:spAutoFit/>
+          </a:bodyPr>
+          <a:lstStyle/>
+          <a:p>
+            <a:r>
+              <a:rPr lang="en-US" dirty="0" smtClean="0"/>
+              <a:t>1</a:t>
+            </a:r>
+            <a:endParaRPr lang="en-US" dirty="0"/>
+          </a:p>
+        </p:txBody>
+      </p:sp>
+      <p:sp>
+        <p:nvSpPr>
+          <p:cNvPr id="28" name="Oval 27"/>
+          <p:cNvSpPr/>
+          <p:nvPr/>
+        </p:nvSpPr>
+        <p:spPr>
+          <a:xfrm>
+            <a:off x="584200" y="4025900"/>
+            <a:ext cx="292100" cy="292100"/>
+          </a:xfrm>
+          <a:prstGeom prst="ellipse">
+            <a:avLst/>
+          </a:prstGeom>
+          <a:noFill/>
+        </p:spPr>
+        <p:style>
+          <a:lnRef idx="1">
+            <a:schemeClr val="accent1"/>
+          </a:lnRef>
+          <a:fillRef idx="3">
+            <a:schemeClr val="accent1"/>
+          </a:fillRef>
+          <a:effectRef idx="2">
+            <a:schemeClr val="accent1"/>
+          </a:effectRef>
+          <a:fontRef idx="minor">
+            <a:schemeClr val="lt1"/>
+          </a:fontRef>
+        </p:style>
+        <p:txBody>
+          <a:bodyPr rtlCol="0" anchor="ctr"/>
+          <a:lstStyle/>
+          <a:p>
+            <a:pPr algn="ctr"/>
+            <a:endParaRPr lang="en-US"/>
+          </a:p>
+        </p:txBody>
+      </p:sp>
+      <p:sp>
+        <p:nvSpPr>
+          <p:cNvPr id="29" name="TextBox 28"/>
+          <p:cNvSpPr txBox="1"/>
+          <p:nvPr/>
+        </p:nvSpPr>
+        <p:spPr>
+          <a:xfrm>
+            <a:off x="571500" y="3987800"/>
+            <a:ext cx="301660" cy="369332"/>
+          </a:xfrm>
+          <a:prstGeom prst="rect">
+            <a:avLst/>
+          </a:prstGeom>
+          <a:noFill/>
+        </p:spPr>
+        <p:txBody>
+          <a:bodyPr wrap="none" rtlCol="0">
+            <a:spAutoFit/>
+          </a:bodyPr>
+          <a:lstStyle/>
+          <a:p>
+            <a:r>
+              <a:rPr lang="en-US" dirty="0" smtClean="0"/>
+              <a:t>2</a:t>
+            </a:r>
+            <a:endParaRPr lang="en-US" dirty="0"/>
+          </a:p>
+        </p:txBody>
+      </p:sp>
+      <p:sp>
+        <p:nvSpPr>
+          <p:cNvPr id="30" name="TextBox 29"/>
+          <p:cNvSpPr txBox="1"/>
+          <p:nvPr/>
+        </p:nvSpPr>
+        <p:spPr>
+          <a:xfrm>
+            <a:off x="0" y="3302000"/>
+            <a:ext cx="2595582" cy="369332"/>
+          </a:xfrm>
+          <a:prstGeom prst="rect">
+            <a:avLst/>
+          </a:prstGeom>
+          <a:noFill/>
+        </p:spPr>
+        <p:txBody>
+          <a:bodyPr wrap="none" rtlCol="0">
+            <a:spAutoFit/>
+          </a:bodyPr>
+          <a:lstStyle/>
+          <a:p>
+            <a:r>
+              <a:rPr lang="en-US" dirty="0" smtClean="0"/>
+              <a:t>Creating sharable content</a:t>
+            </a:r>
+            <a:endParaRPr lang="en-US" dirty="0"/>
+          </a:p>
+        </p:txBody>
+      </p:sp>
+      <p:sp>
+        <p:nvSpPr>
+          <p:cNvPr id="31" name="Oval 30"/>
+          <p:cNvSpPr/>
+          <p:nvPr/>
+        </p:nvSpPr>
+        <p:spPr>
+          <a:xfrm>
+            <a:off x="2463800" y="4445000"/>
+            <a:ext cx="292100" cy="292100"/>
+          </a:xfrm>
+          <a:prstGeom prst="ellipse">
+            <a:avLst/>
+          </a:prstGeom>
+          <a:noFill/>
+        </p:spPr>
+        <p:style>
+          <a:lnRef idx="1">
+            <a:schemeClr val="accent1"/>
+          </a:lnRef>
+          <a:fillRef idx="3">
+            <a:schemeClr val="accent1"/>
+          </a:fillRef>
+          <a:effectRef idx="2">
+            <a:schemeClr val="accent1"/>
+          </a:effectRef>
+          <a:fontRef idx="minor">
+            <a:schemeClr val="lt1"/>
+          </a:fontRef>
+        </p:style>
+        <p:txBody>
+          <a:bodyPr rtlCol="0" anchor="ctr"/>
+          <a:lstStyle/>
+          <a:p>
+            <a:pPr algn="ctr"/>
+            <a:endParaRPr lang="en-US"/>
+          </a:p>
+        </p:txBody>
+      </p:sp>
+      <p:sp>
+        <p:nvSpPr>
+          <p:cNvPr id="32" name="TextBox 31"/>
+          <p:cNvSpPr txBox="1"/>
+          <p:nvPr/>
+        </p:nvSpPr>
+        <p:spPr>
+          <a:xfrm>
+            <a:off x="2451100" y="4406900"/>
+            <a:ext cx="301660" cy="369332"/>
+          </a:xfrm>
+          <a:prstGeom prst="rect">
+            <a:avLst/>
+          </a:prstGeom>
+          <a:noFill/>
+        </p:spPr>
+        <p:txBody>
+          <a:bodyPr wrap="none" rtlCol="0">
+            <a:spAutoFit/>
+          </a:bodyPr>
+          <a:lstStyle/>
+          <a:p>
+            <a:r>
+              <a:rPr lang="en-US" dirty="0" smtClean="0"/>
+              <a:t>3</a:t>
+            </a:r>
+            <a:endParaRPr lang="en-US" dirty="0"/>
+          </a:p>
+        </p:txBody>
+      </p:sp>
+      <p:sp>
+        <p:nvSpPr>
+          <p:cNvPr id="33" name="Oval 32"/>
+          <p:cNvSpPr/>
+          <p:nvPr/>
+        </p:nvSpPr>
+        <p:spPr>
+          <a:xfrm>
+            <a:off x="4508500" y="5156200"/>
+            <a:ext cx="292100" cy="292100"/>
+          </a:xfrm>
+          <a:prstGeom prst="ellipse">
+            <a:avLst/>
+          </a:prstGeom>
+          <a:noFill/>
+        </p:spPr>
+        <p:style>
+          <a:lnRef idx="1">
+            <a:schemeClr val="accent1"/>
+          </a:lnRef>
+          <a:fillRef idx="3">
+            <a:schemeClr val="accent1"/>
+          </a:fillRef>
+          <a:effectRef idx="2">
+            <a:schemeClr val="accent1"/>
+          </a:effectRef>
+          <a:fontRef idx="minor">
+            <a:schemeClr val="lt1"/>
+          </a:fontRef>
+        </p:style>
+        <p:txBody>
+          <a:bodyPr rtlCol="0" anchor="ctr"/>
+          <a:lstStyle/>
+          <a:p>
+            <a:pPr algn="ctr"/>
+            <a:endParaRPr lang="en-US"/>
+          </a:p>
+        </p:txBody>
+      </p:sp>
+      <p:sp>
+        <p:nvSpPr>
+          <p:cNvPr id="34" name="TextBox 33"/>
+          <p:cNvSpPr txBox="1"/>
+          <p:nvPr/>
+        </p:nvSpPr>
+        <p:spPr>
+          <a:xfrm>
+            <a:off x="4495800" y="5118100"/>
+            <a:ext cx="301660" cy="369332"/>
+          </a:xfrm>
+          <a:prstGeom prst="rect">
+            <a:avLst/>
+          </a:prstGeom>
+          <a:noFill/>
+        </p:spPr>
+        <p:txBody>
+          <a:bodyPr wrap="none" rtlCol="0">
+            <a:spAutoFit/>
+          </a:bodyPr>
+          <a:lstStyle/>
+          <a:p>
+            <a:r>
+              <a:rPr lang="en-US" dirty="0" smtClean="0"/>
+              <a:t>4</a:t>
+            </a:r>
+            <a:endParaRPr lang="en-US" dirty="0"/>
+          </a:p>
+        </p:txBody>
+      </p:sp>
+      <p:sp>
+        <p:nvSpPr>
+          <p:cNvPr id="35" name="TextBox 34"/>
+          <p:cNvSpPr txBox="1"/>
+          <p:nvPr/>
+        </p:nvSpPr>
+        <p:spPr>
+          <a:xfrm>
+            <a:off x="2273300" y="5283200"/>
+            <a:ext cx="885955" cy="369332"/>
+          </a:xfrm>
+          <a:prstGeom prst="rect">
+            <a:avLst/>
+          </a:prstGeom>
+          <a:noFill/>
+        </p:spPr>
+        <p:txBody>
+          <a:bodyPr wrap="none" rtlCol="0">
+            <a:spAutoFit/>
+          </a:bodyPr>
+          <a:lstStyle/>
+          <a:p>
+            <a:r>
+              <a:rPr lang="en-US" dirty="0" smtClean="0"/>
+              <a:t>Sharing</a:t>
+            </a:r>
+            <a:endParaRPr lang="en-US" dirty="0"/>
+          </a:p>
+        </p:txBody>
+      </p:sp>
+      <p:sp>
+        <p:nvSpPr>
+          <p:cNvPr id="36" name="TextBox 35"/>
+          <p:cNvSpPr txBox="1"/>
+          <p:nvPr/>
+        </p:nvSpPr>
+        <p:spPr>
+          <a:xfrm>
+            <a:off x="6210300" y="3949700"/>
+            <a:ext cx="2584737" cy="369332"/>
+          </a:xfrm>
+          <a:prstGeom prst="rect">
+            <a:avLst/>
+          </a:prstGeom>
+          <a:noFill/>
+        </p:spPr>
+        <p:txBody>
+          <a:bodyPr wrap="none" rtlCol="0">
+            <a:spAutoFit/>
+          </a:bodyPr>
+          <a:lstStyle/>
+          <a:p>
+            <a:r>
+              <a:rPr lang="en-US" dirty="0" smtClean="0"/>
+              <a:t>Similar attack is mitigated </a:t>
+            </a:r>
+            <a:endParaRPr lang="en-US" dirty="0"/>
+          </a:p>
+        </p:txBody>
+      </p:sp>
+    </p:spTree>
+    <p:extLst>
+      <p:ext uri="{BB962C8B-B14F-4D97-AF65-F5344CB8AC3E}">
+        <p14:creationId xmlns:p14="http://schemas.microsoft.com/office/powerpoint/2010/main" val="3380999613"/>
+      </p:ext>
+    </p:extLst>
+  </p:cSld>
+  <p:clrMapOvr>
+    <a:masterClrMapping/>
+  </p:clrMapOvr>
+  <p:timing>
+    <p:tnLst>
+      <p:par>
+        <p:cTn id="1" dur="indefinite" restart="never" nodeType="tmRoot"/>
+      </p:par>
+    </p:tnLst>
+  </p:timing>
+</p:sld>
+</file>
+
+<file path=ppt/slides/slide7.xml><?xml version="1.0" encoding="utf-8"?>
+<p:sld xmlns:a="http://schemas.openxmlformats.org/drawingml/2006/main" xmlns:r="http://schemas.openxmlformats.org/officeDocument/2006/relationships" xmlns:p="http://schemas.openxmlformats.org/presentationml/2006/main">
+  <p:cSld>
+    <p:spTree>
+      <p:nvGrpSpPr>
+        <p:cNvPr id="1" name=""/>
+        <p:cNvGrpSpPr/>
+        <p:nvPr/>
+      </p:nvGrpSpPr>
+      <p:grpSpPr>
+        <a:xfrm>
+          <a:off x="0" y="0"/>
+          <a:ext cx="0" cy="0"/>
+          <a:chOff x="0" y="0"/>
+          <a:chExt cx="0" cy="0"/>
+        </a:xfrm>
+      </p:grpSpPr>
+      <p:sp>
+        <p:nvSpPr>
+          <p:cNvPr id="2" name="Title 1"/>
+          <p:cNvSpPr>
+            <a:spLocks noGrp="1"/>
+          </p:cNvSpPr>
+          <p:nvPr>
+            <p:ph type="title"/>
+          </p:nvPr>
+        </p:nvSpPr>
+        <p:spPr/>
+        <p:txBody>
+          <a:bodyPr/>
+          <a:lstStyle/>
+          <a:p>
+            <a:endParaRPr lang="en-US"/>
+          </a:p>
+        </p:txBody>
+      </p:sp>
+      <p:sp>
+        <p:nvSpPr>
+          <p:cNvPr id="3" name="Text Placeholder 2"/>
+          <p:cNvSpPr>
+            <a:spLocks noGrp="1"/>
+          </p:cNvSpPr>
+          <p:nvPr>
+            <p:ph type="body" sz="quarter" idx="13"/>
+          </p:nvPr>
+        </p:nvSpPr>
+        <p:spPr/>
+        <p:txBody>
+          <a:bodyPr/>
+          <a:lstStyle/>
+          <a:p>
+            <a:endParaRPr lang="en-US"/>
+          </a:p>
+        </p:txBody>
+      </p:sp>
+      <p:pic>
+        <p:nvPicPr>
+          <p:cNvPr id="3074" name="Picture 2" descr="C:\Users\Cory\AppData\Local\Microsoft\Windows\Temporary Internet Files\Content.IE5\2E2TCEXO\big-data[1].jpg"/>
+          <p:cNvPicPr>
+            <a:picLocks noChangeAspect="1" noChangeArrowheads="1"/>
+          </p:cNvPicPr>
+          <p:nvPr/>
+        </p:nvPicPr>
+        <p:blipFill>
+          <a:blip r:embed="rId2" cstate="print">
+            <a:extLst>
+              <a:ext uri="{28A0092B-C50C-407E-A947-70E740481C1C}">
+                <a14:useLocalDpi xmlns:a14="http://schemas.microsoft.com/office/drawing/2010/main" val="0"/>
+              </a:ext>
+            </a:extLst>
+          </a:blip>
+          <a:srcRect/>
+          <a:stretch>
+            <a:fillRect/>
+          </a:stretch>
+        </p:blipFill>
+        <p:spPr bwMode="auto">
+          <a:xfrm>
+            <a:off x="4038600" y="2209800"/>
+            <a:ext cx="4064000" cy="3048000"/>
+          </a:xfrm>
+          <a:prstGeom prst="rect">
+            <a:avLst/>
+          </a:prstGeom>
+          <a:noFill/>
+          <a:extLst>
+            <a:ext uri="{909E8E84-426E-40DD-AFC4-6F175D3DCCD1}">
+              <a14:hiddenFill xmlns:a14="http://schemas.microsoft.com/office/drawing/2010/main">
+                <a:solidFill>
+                  <a:srgbClr val="FFFFFF"/>
+                </a:solidFill>
+              </a14:hiddenFill>
+            </a:ext>
+          </a:extLst>
+        </p:spPr>
+      </p:pic>
+      <p:pic>
+        <p:nvPicPr>
+          <p:cNvPr id="5" name="Picture 2" descr="C:\Users\Cory\AppData\Local\Microsoft\Windows\Temporary Internet Files\Content.IE5\M23DN4D3\cyber_security[1].jpg"/>
+          <p:cNvPicPr>
+            <a:picLocks noChangeAspect="1" noChangeArrowheads="1"/>
+          </p:cNvPicPr>
+          <p:nvPr/>
+        </p:nvPicPr>
+        <p:blipFill>
+          <a:blip r:embed="rId3" cstate="print">
+            <a:extLst>
+              <a:ext uri="{28A0092B-C50C-407E-A947-70E740481C1C}">
+                <a14:useLocalDpi xmlns:a14="http://schemas.microsoft.com/office/drawing/2010/main" val="0"/>
+              </a:ext>
+            </a:extLst>
+          </a:blip>
+          <a:srcRect/>
+          <a:stretch>
+            <a:fillRect/>
+          </a:stretch>
+        </p:blipFill>
+        <p:spPr bwMode="auto">
+          <a:xfrm>
+            <a:off x="762000" y="2209800"/>
+            <a:ext cx="2667000" cy="2667000"/>
+          </a:xfrm>
+          <a:prstGeom prst="rect">
+            <a:avLst/>
+          </a:prstGeom>
+          <a:noFill/>
+          <a:extLst>
+            <a:ext uri="{909E8E84-426E-40DD-AFC4-6F175D3DCCD1}">
+              <a14:hiddenFill xmlns:a14="http://schemas.microsoft.com/office/drawing/2010/main">
+                <a:solidFill>
+                  <a:srgbClr val="FFFFFF"/>
+                </a:solidFill>
+              </a14:hiddenFill>
+            </a:ext>
+          </a:extLst>
+        </p:spPr>
+      </p:pic>
+    </p:spTree>
+    <p:extLst>
+      <p:ext uri="{BB962C8B-B14F-4D97-AF65-F5344CB8AC3E}">
+        <p14:creationId xmlns:p14="http://schemas.microsoft.com/office/powerpoint/2010/main" val="2140247965"/>
       </p:ext>
     </p:extLst>
   </p:cSld>

</xml_diff>